<commit_message>
Corrected an english error
</commit_message>
<xml_diff>
--- a/Idea/PowerPoint/WeFood - Idea.pptx
+++ b/Idea/PowerPoint/WeFood - Idea.pptx
@@ -494,7 +494,7 @@
           <a:p>
             <a:fld id="{0EF95162-6873-F647-B392-BF6A1F606277}" type="datetimeFigureOut">
               <a:rPr lang="it-IT" smtClean="0"/>
-              <a:t>05/12/2023</a:t>
+              <a:t>06/12/2023</a:t>
             </a:fld>
             <a:endParaRPr lang="it-IT"/>
           </a:p>
@@ -948,7 +948,7 @@
           <a:p>
             <a:fld id="{2FDCBEE4-315A-8E42-835E-29A1DAE07625}" type="datetimeFigureOut">
               <a:rPr lang="it-IT" smtClean="0"/>
-              <a:t>05/12/2023</a:t>
+              <a:t>06/12/2023</a:t>
             </a:fld>
             <a:endParaRPr lang="it-IT"/>
           </a:p>
@@ -1140,7 +1140,7 @@
           <a:p>
             <a:fld id="{2FDCBEE4-315A-8E42-835E-29A1DAE07625}" type="datetimeFigureOut">
               <a:rPr lang="it-IT" smtClean="0"/>
-              <a:t>05/12/2023</a:t>
+              <a:t>06/12/2023</a:t>
             </a:fld>
             <a:endParaRPr lang="it-IT"/>
           </a:p>
@@ -1342,7 +1342,7 @@
           <a:p>
             <a:fld id="{2FDCBEE4-315A-8E42-835E-29A1DAE07625}" type="datetimeFigureOut">
               <a:rPr lang="it-IT" smtClean="0"/>
-              <a:t>05/12/2023</a:t>
+              <a:t>06/12/2023</a:t>
             </a:fld>
             <a:endParaRPr lang="it-IT"/>
           </a:p>
@@ -1534,7 +1534,7 @@
           <a:p>
             <a:fld id="{2FDCBEE4-315A-8E42-835E-29A1DAE07625}" type="datetimeFigureOut">
               <a:rPr lang="it-IT" smtClean="0"/>
-              <a:t>05/12/2023</a:t>
+              <a:t>06/12/2023</a:t>
             </a:fld>
             <a:endParaRPr lang="it-IT"/>
           </a:p>
@@ -1803,7 +1803,7 @@
           <a:p>
             <a:fld id="{2FDCBEE4-315A-8E42-835E-29A1DAE07625}" type="datetimeFigureOut">
               <a:rPr lang="it-IT" smtClean="0"/>
-              <a:t>05/12/2023</a:t>
+              <a:t>06/12/2023</a:t>
             </a:fld>
             <a:endParaRPr lang="it-IT"/>
           </a:p>
@@ -2112,7 +2112,7 @@
           <a:p>
             <a:fld id="{2FDCBEE4-315A-8E42-835E-29A1DAE07625}" type="datetimeFigureOut">
               <a:rPr lang="it-IT" smtClean="0"/>
-              <a:t>05/12/2023</a:t>
+              <a:t>06/12/2023</a:t>
             </a:fld>
             <a:endParaRPr lang="it-IT"/>
           </a:p>
@@ -2555,7 +2555,7 @@
           <a:p>
             <a:fld id="{2FDCBEE4-315A-8E42-835E-29A1DAE07625}" type="datetimeFigureOut">
               <a:rPr lang="it-IT" smtClean="0"/>
-              <a:t>05/12/2023</a:t>
+              <a:t>06/12/2023</a:t>
             </a:fld>
             <a:endParaRPr lang="it-IT"/>
           </a:p>
@@ -2696,7 +2696,7 @@
           <a:p>
             <a:fld id="{2FDCBEE4-315A-8E42-835E-29A1DAE07625}" type="datetimeFigureOut">
               <a:rPr lang="it-IT" smtClean="0"/>
-              <a:t>05/12/2023</a:t>
+              <a:t>06/12/2023</a:t>
             </a:fld>
             <a:endParaRPr lang="it-IT"/>
           </a:p>
@@ -2815,7 +2815,7 @@
           <a:p>
             <a:fld id="{2FDCBEE4-315A-8E42-835E-29A1DAE07625}" type="datetimeFigureOut">
               <a:rPr lang="it-IT" smtClean="0"/>
-              <a:t>05/12/2023</a:t>
+              <a:t>06/12/2023</a:t>
             </a:fld>
             <a:endParaRPr lang="it-IT"/>
           </a:p>
@@ -3114,7 +3114,7 @@
           <a:p>
             <a:fld id="{2FDCBEE4-315A-8E42-835E-29A1DAE07625}" type="datetimeFigureOut">
               <a:rPr lang="it-IT" smtClean="0"/>
-              <a:t>05/12/2023</a:t>
+              <a:t>06/12/2023</a:t>
             </a:fld>
             <a:endParaRPr lang="it-IT"/>
           </a:p>
@@ -3390,7 +3390,7 @@
           <a:p>
             <a:fld id="{2FDCBEE4-315A-8E42-835E-29A1DAE07625}" type="datetimeFigureOut">
               <a:rPr lang="it-IT" smtClean="0"/>
-              <a:t>05/12/2023</a:t>
+              <a:t>06/12/2023</a:t>
             </a:fld>
             <a:endParaRPr lang="it-IT"/>
           </a:p>
@@ -5039,7 +5039,7 @@
             </a:pPr>
             <a:r>
               <a:rPr lang="en-US" i="1" dirty="0"/>
-              <a:t>Allow users to look for new recipes filtering the ingredients.</a:t>
+              <a:t>Allow users to look for new recipes filtering by the ingredients.</a:t>
             </a:r>
           </a:p>
           <a:p>
@@ -5067,7 +5067,7 @@
             </a:pPr>
             <a:r>
               <a:rPr lang="en-US" i="1" dirty="0"/>
-              <a:t>Find users filtering with different settings defined by the admin.</a:t>
+              <a:t>Find users filtering by different settings defined by the admin.</a:t>
             </a:r>
           </a:p>
           <a:p>

</xml_diff>